<commit_message>
Update documentation and pinout
</commit_message>
<xml_diff>
--- a/documentation/brochages.pptx
+++ b/documentation/brochages.pptx
@@ -200,7 +200,7 @@
           <a:p>
             <a:fld id="{DAC67291-13FB-4A85-9B62-8BED92F848C0}" type="datetimeFigureOut">
               <a:rPr lang="fr-FR" smtClean="0"/>
-              <a:t>27/10/2023</a:t>
+              <a:t>13/02/2024</a:t>
             </a:fld>
             <a:endParaRPr lang="fr-FR"/>
           </a:p>
@@ -698,7 +698,7 @@
           <a:p>
             <a:fld id="{9F9D7BD0-09ED-4241-9B50-84DC221E5746}" type="datetimeFigureOut">
               <a:rPr lang="fr-FR" smtClean="0"/>
-              <a:t>27/10/2023</a:t>
+              <a:t>13/02/2024</a:t>
             </a:fld>
             <a:endParaRPr lang="fr-FR"/>
           </a:p>
@@ -896,7 +896,7 @@
           <a:p>
             <a:fld id="{9F9D7BD0-09ED-4241-9B50-84DC221E5746}" type="datetimeFigureOut">
               <a:rPr lang="fr-FR" smtClean="0"/>
-              <a:t>27/10/2023</a:t>
+              <a:t>13/02/2024</a:t>
             </a:fld>
             <a:endParaRPr lang="fr-FR"/>
           </a:p>
@@ -1104,7 +1104,7 @@
           <a:p>
             <a:fld id="{9F9D7BD0-09ED-4241-9B50-84DC221E5746}" type="datetimeFigureOut">
               <a:rPr lang="fr-FR" smtClean="0"/>
-              <a:t>27/10/2023</a:t>
+              <a:t>13/02/2024</a:t>
             </a:fld>
             <a:endParaRPr lang="fr-FR"/>
           </a:p>
@@ -1302,7 +1302,7 @@
           <a:p>
             <a:fld id="{9F9D7BD0-09ED-4241-9B50-84DC221E5746}" type="datetimeFigureOut">
               <a:rPr lang="fr-FR" smtClean="0"/>
-              <a:t>27/10/2023</a:t>
+              <a:t>13/02/2024</a:t>
             </a:fld>
             <a:endParaRPr lang="fr-FR"/>
           </a:p>
@@ -1577,7 +1577,7 @@
           <a:p>
             <a:fld id="{9F9D7BD0-09ED-4241-9B50-84DC221E5746}" type="datetimeFigureOut">
               <a:rPr lang="fr-FR" smtClean="0"/>
-              <a:t>27/10/2023</a:t>
+              <a:t>13/02/2024</a:t>
             </a:fld>
             <a:endParaRPr lang="fr-FR"/>
           </a:p>
@@ -1842,7 +1842,7 @@
           <a:p>
             <a:fld id="{9F9D7BD0-09ED-4241-9B50-84DC221E5746}" type="datetimeFigureOut">
               <a:rPr lang="fr-FR" smtClean="0"/>
-              <a:t>27/10/2023</a:t>
+              <a:t>13/02/2024</a:t>
             </a:fld>
             <a:endParaRPr lang="fr-FR"/>
           </a:p>
@@ -2254,7 +2254,7 @@
           <a:p>
             <a:fld id="{9F9D7BD0-09ED-4241-9B50-84DC221E5746}" type="datetimeFigureOut">
               <a:rPr lang="fr-FR" smtClean="0"/>
-              <a:t>27/10/2023</a:t>
+              <a:t>13/02/2024</a:t>
             </a:fld>
             <a:endParaRPr lang="fr-FR"/>
           </a:p>
@@ -2395,7 +2395,7 @@
           <a:p>
             <a:fld id="{9F9D7BD0-09ED-4241-9B50-84DC221E5746}" type="datetimeFigureOut">
               <a:rPr lang="fr-FR" smtClean="0"/>
-              <a:t>27/10/2023</a:t>
+              <a:t>13/02/2024</a:t>
             </a:fld>
             <a:endParaRPr lang="fr-FR"/>
           </a:p>
@@ -2508,7 +2508,7 @@
           <a:p>
             <a:fld id="{9F9D7BD0-09ED-4241-9B50-84DC221E5746}" type="datetimeFigureOut">
               <a:rPr lang="fr-FR" smtClean="0"/>
-              <a:t>27/10/2023</a:t>
+              <a:t>13/02/2024</a:t>
             </a:fld>
             <a:endParaRPr lang="fr-FR"/>
           </a:p>
@@ -2819,7 +2819,7 @@
           <a:p>
             <a:fld id="{9F9D7BD0-09ED-4241-9B50-84DC221E5746}" type="datetimeFigureOut">
               <a:rPr lang="fr-FR" smtClean="0"/>
-              <a:t>27/10/2023</a:t>
+              <a:t>13/02/2024</a:t>
             </a:fld>
             <a:endParaRPr lang="fr-FR"/>
           </a:p>
@@ -3107,7 +3107,7 @@
           <a:p>
             <a:fld id="{9F9D7BD0-09ED-4241-9B50-84DC221E5746}" type="datetimeFigureOut">
               <a:rPr lang="fr-FR" smtClean="0"/>
-              <a:t>27/10/2023</a:t>
+              <a:t>13/02/2024</a:t>
             </a:fld>
             <a:endParaRPr lang="fr-FR"/>
           </a:p>
@@ -3348,7 +3348,7 @@
           <a:p>
             <a:fld id="{9F9D7BD0-09ED-4241-9B50-84DC221E5746}" type="datetimeFigureOut">
               <a:rPr lang="fr-FR" smtClean="0"/>
-              <a:t>27/10/2023</a:t>
+              <a:t>13/02/2024</a:t>
             </a:fld>
             <a:endParaRPr lang="fr-FR"/>
           </a:p>
@@ -5935,58 +5935,6 @@
       </p:sp>
       <p:sp>
         <p:nvSpPr>
-          <p:cNvPr id="37" name="Rectangle : coins arrondis 36">
-            <a:extLst>
-              <a:ext uri="{FF2B5EF4-FFF2-40B4-BE49-F238E27FC236}">
-                <a16:creationId xmlns:a16="http://schemas.microsoft.com/office/drawing/2014/main" id="{BE9CF73D-B186-454C-8035-54EF05FC839D}"/>
-              </a:ext>
-            </a:extLst>
-          </p:cNvPr>
-          <p:cNvSpPr/>
-          <p:nvPr/>
-        </p:nvSpPr>
-        <p:spPr>
-          <a:xfrm>
-            <a:off x="9298589" y="5520285"/>
-            <a:ext cx="854593" cy="148656"/>
-          </a:xfrm>
-          <a:prstGeom prst="roundRect">
-            <a:avLst/>
-          </a:prstGeom>
-          <a:solidFill>
-            <a:srgbClr val="4472C4"/>
-          </a:solidFill>
-        </p:spPr>
-        <p:style>
-          <a:lnRef idx="2">
-            <a:schemeClr val="accent1">
-              <a:shade val="50000"/>
-            </a:schemeClr>
-          </a:lnRef>
-          <a:fillRef idx="1">
-            <a:schemeClr val="accent1"/>
-          </a:fillRef>
-          <a:effectRef idx="0">
-            <a:schemeClr val="accent1"/>
-          </a:effectRef>
-          <a:fontRef idx="minor">
-            <a:schemeClr val="lt1"/>
-          </a:fontRef>
-        </p:style>
-        <p:txBody>
-          <a:bodyPr rtlCol="0" anchor="ctr"/>
-          <a:lstStyle/>
-          <a:p>
-            <a:pPr algn="ctr"/>
-            <a:r>
-              <a:rPr lang="fr-FR" sz="900" dirty="0"/>
-              <a:t>PC_4</a:t>
-            </a:r>
-          </a:p>
-        </p:txBody>
-      </p:sp>
-      <p:sp>
-        <p:nvSpPr>
           <p:cNvPr id="38" name="Rectangle : coins arrondis 37">
             <a:extLst>
               <a:ext uri="{FF2B5EF4-FFF2-40B4-BE49-F238E27FC236}">
@@ -9955,7 +9903,7 @@
         </p:nvSpPr>
         <p:spPr>
           <a:xfrm>
-            <a:off x="7073843" y="5518169"/>
+            <a:off x="7078923" y="5518169"/>
             <a:ext cx="854593" cy="148656"/>
           </a:xfrm>
           <a:prstGeom prst="roundRect">
@@ -10249,58 +10197,6 @@
             <a:r>
               <a:rPr lang="fr-FR" sz="900" dirty="0"/>
               <a:t>MOT1_CFG3</a:t>
-            </a:r>
-          </a:p>
-        </p:txBody>
-      </p:sp>
-      <p:sp>
-        <p:nvSpPr>
-          <p:cNvPr id="64" name="Rectangle : coins arrondis 63">
-            <a:extLst>
-              <a:ext uri="{FF2B5EF4-FFF2-40B4-BE49-F238E27FC236}">
-                <a16:creationId xmlns:a16="http://schemas.microsoft.com/office/drawing/2014/main" id="{FAB511FA-E123-1F1D-4D00-AF1C3FB0D901}"/>
-              </a:ext>
-            </a:extLst>
-          </p:cNvPr>
-          <p:cNvSpPr/>
-          <p:nvPr/>
-        </p:nvSpPr>
-        <p:spPr>
-          <a:xfrm>
-            <a:off x="10228527" y="5514902"/>
-            <a:ext cx="854593" cy="148656"/>
-          </a:xfrm>
-          <a:prstGeom prst="roundRect">
-            <a:avLst/>
-          </a:prstGeom>
-          <a:solidFill>
-            <a:srgbClr val="ED7D31"/>
-          </a:solidFill>
-        </p:spPr>
-        <p:style>
-          <a:lnRef idx="2">
-            <a:schemeClr val="accent1">
-              <a:shade val="50000"/>
-            </a:schemeClr>
-          </a:lnRef>
-          <a:fillRef idx="1">
-            <a:schemeClr val="accent1"/>
-          </a:fillRef>
-          <a:effectRef idx="0">
-            <a:schemeClr val="accent1"/>
-          </a:effectRef>
-          <a:fontRef idx="minor">
-            <a:schemeClr val="lt1"/>
-          </a:fontRef>
-        </p:style>
-        <p:txBody>
-          <a:bodyPr rtlCol="0" anchor="ctr"/>
-          <a:lstStyle/>
-          <a:p>
-            <a:pPr algn="ctr"/>
-            <a:r>
-              <a:rPr lang="fr-FR" sz="900" dirty="0"/>
-              <a:t>MOT1_STEP</a:t>
             </a:r>
           </a:p>
         </p:txBody>
@@ -10586,6 +10482,162 @@
                 <a:srgbClr val="002060"/>
               </a:solidFill>
             </a:endParaRPr>
+          </a:p>
+        </p:txBody>
+      </p:sp>
+      <p:sp>
+        <p:nvSpPr>
+          <p:cNvPr id="3" name="Rectangle : coins arrondis 2">
+            <a:extLst>
+              <a:ext uri="{FF2B5EF4-FFF2-40B4-BE49-F238E27FC236}">
+                <a16:creationId xmlns:a16="http://schemas.microsoft.com/office/drawing/2014/main" id="{6A5C8453-1465-4765-F76D-8B81D62B4987}"/>
+              </a:ext>
+            </a:extLst>
+          </p:cNvPr>
+          <p:cNvSpPr/>
+          <p:nvPr/>
+        </p:nvSpPr>
+        <p:spPr>
+          <a:xfrm>
+            <a:off x="9298586" y="5510732"/>
+            <a:ext cx="854593" cy="148656"/>
+          </a:xfrm>
+          <a:prstGeom prst="roundRect">
+            <a:avLst/>
+          </a:prstGeom>
+          <a:solidFill>
+            <a:srgbClr val="ED7D31"/>
+          </a:solidFill>
+        </p:spPr>
+        <p:style>
+          <a:lnRef idx="2">
+            <a:schemeClr val="accent1">
+              <a:shade val="50000"/>
+            </a:schemeClr>
+          </a:lnRef>
+          <a:fillRef idx="1">
+            <a:schemeClr val="accent1"/>
+          </a:fillRef>
+          <a:effectRef idx="0">
+            <a:schemeClr val="accent1"/>
+          </a:effectRef>
+          <a:fontRef idx="minor">
+            <a:schemeClr val="lt1"/>
+          </a:fontRef>
+        </p:style>
+        <p:txBody>
+          <a:bodyPr rtlCol="0" anchor="ctr"/>
+          <a:lstStyle/>
+          <a:p>
+            <a:pPr algn="ctr"/>
+            <a:r>
+              <a:rPr lang="fr-FR" sz="900" dirty="0"/>
+              <a:t>PC_4</a:t>
+            </a:r>
+          </a:p>
+        </p:txBody>
+      </p:sp>
+      <p:sp>
+        <p:nvSpPr>
+          <p:cNvPr id="74" name="Rectangle : coins arrondis 73">
+            <a:extLst>
+              <a:ext uri="{FF2B5EF4-FFF2-40B4-BE49-F238E27FC236}">
+                <a16:creationId xmlns:a16="http://schemas.microsoft.com/office/drawing/2014/main" id="{A67214F0-22F5-1DB0-CCE8-730E85E93EEA}"/>
+              </a:ext>
+            </a:extLst>
+          </p:cNvPr>
+          <p:cNvSpPr/>
+          <p:nvPr/>
+        </p:nvSpPr>
+        <p:spPr>
+          <a:xfrm>
+            <a:off x="10228094" y="5516170"/>
+            <a:ext cx="854593" cy="148656"/>
+          </a:xfrm>
+          <a:prstGeom prst="roundRect">
+            <a:avLst/>
+          </a:prstGeom>
+        </p:spPr>
+        <p:style>
+          <a:lnRef idx="2">
+            <a:schemeClr val="accent1">
+              <a:shade val="50000"/>
+            </a:schemeClr>
+          </a:lnRef>
+          <a:fillRef idx="1">
+            <a:schemeClr val="accent1"/>
+          </a:fillRef>
+          <a:effectRef idx="0">
+            <a:schemeClr val="accent1"/>
+          </a:effectRef>
+          <a:fontRef idx="minor">
+            <a:schemeClr val="lt1"/>
+          </a:fontRef>
+        </p:style>
+        <p:txBody>
+          <a:bodyPr rtlCol="0" anchor="ctr"/>
+          <a:lstStyle/>
+          <a:p>
+            <a:pPr algn="ctr"/>
+            <a:r>
+              <a:rPr lang="fr-FR" sz="900" dirty="0"/>
+              <a:t>MOT1_STEP*</a:t>
+            </a:r>
+          </a:p>
+        </p:txBody>
+      </p:sp>
+      <p:sp>
+        <p:nvSpPr>
+          <p:cNvPr id="75" name="ZoneTexte 74">
+            <a:extLst>
+              <a:ext uri="{FF2B5EF4-FFF2-40B4-BE49-F238E27FC236}">
+                <a16:creationId xmlns:a16="http://schemas.microsoft.com/office/drawing/2014/main" id="{304DF0EB-351A-4575-898B-CB86BE35D0C2}"/>
+              </a:ext>
+            </a:extLst>
+          </p:cNvPr>
+          <p:cNvSpPr txBox="1"/>
+          <p:nvPr/>
+        </p:nvSpPr>
+        <p:spPr>
+          <a:xfrm>
+            <a:off x="9946905" y="6383695"/>
+            <a:ext cx="1826141" cy="307777"/>
+          </a:xfrm>
+          <a:prstGeom prst="rect">
+            <a:avLst/>
+          </a:prstGeom>
+          <a:noFill/>
+        </p:spPr>
+        <p:txBody>
+          <a:bodyPr wrap="none" rtlCol="0">
+            <a:spAutoFit/>
+          </a:bodyPr>
+          <a:lstStyle/>
+          <a:p>
+            <a:r>
+              <a:rPr lang="fr-FR" sz="1400" b="1" dirty="0">
+                <a:solidFill>
+                  <a:srgbClr val="002060"/>
+                </a:solidFill>
+              </a:rPr>
+              <a:t>* Must </a:t>
+            </a:r>
+            <a:r>
+              <a:rPr lang="fr-FR" sz="1400" b="1" dirty="0" err="1">
+                <a:solidFill>
+                  <a:srgbClr val="002060"/>
+                </a:solidFill>
+              </a:rPr>
+              <a:t>be</a:t>
+            </a:r>
+            <a:r>
+              <a:rPr lang="fr-FR" sz="1400" b="1" dirty="0">
+                <a:solidFill>
+                  <a:srgbClr val="002060"/>
+                </a:solidFill>
+              </a:rPr>
+              <a:t> set as input</a:t>
+            </a:r>
           </a:p>
         </p:txBody>
       </p:sp>

</xml_diff>